<commit_message>
Updated files, added new content
</commit_message>
<xml_diff>
--- a/01. Überblick/01. Jump Start Überblick.pptx
+++ b/01. Überblick/01. Jump Start Überblick.pptx
@@ -5,15 +5,15 @@
     <p:sldMasterId id="2147484690" r:id="rId1"/>
   </p:sldMasterIdLst>
   <p:notesMasterIdLst>
-    <p:notesMasterId r:id="rId40"/>
+    <p:notesMasterId r:id="rId41"/>
   </p:notesMasterIdLst>
   <p:handoutMasterIdLst>
-    <p:handoutMasterId r:id="rId41"/>
+    <p:handoutMasterId r:id="rId42"/>
   </p:handoutMasterIdLst>
   <p:sldIdLst>
     <p:sldId id="332" r:id="rId2"/>
-    <p:sldId id="342" r:id="rId3"/>
-    <p:sldId id="358" r:id="rId4"/>
+    <p:sldId id="401" r:id="rId3"/>
+    <p:sldId id="402" r:id="rId4"/>
     <p:sldId id="359" r:id="rId5"/>
     <p:sldId id="299" r:id="rId6"/>
     <p:sldId id="360" r:id="rId7"/>
@@ -37,18 +37,19 @@
     <p:sldId id="361" r:id="rId25"/>
     <p:sldId id="362" r:id="rId26"/>
     <p:sldId id="369" r:id="rId27"/>
-    <p:sldId id="377" r:id="rId28"/>
-    <p:sldId id="370" r:id="rId29"/>
-    <p:sldId id="371" r:id="rId30"/>
-    <p:sldId id="372" r:id="rId31"/>
-    <p:sldId id="376" r:id="rId32"/>
-    <p:sldId id="379" r:id="rId33"/>
-    <p:sldId id="380" r:id="rId34"/>
-    <p:sldId id="381" r:id="rId35"/>
-    <p:sldId id="382" r:id="rId36"/>
-    <p:sldId id="378" r:id="rId37"/>
-    <p:sldId id="383" r:id="rId38"/>
-    <p:sldId id="290" r:id="rId39"/>
+    <p:sldId id="403" r:id="rId28"/>
+    <p:sldId id="377" r:id="rId29"/>
+    <p:sldId id="370" r:id="rId30"/>
+    <p:sldId id="371" r:id="rId31"/>
+    <p:sldId id="372" r:id="rId32"/>
+    <p:sldId id="376" r:id="rId33"/>
+    <p:sldId id="379" r:id="rId34"/>
+    <p:sldId id="380" r:id="rId35"/>
+    <p:sldId id="381" r:id="rId36"/>
+    <p:sldId id="382" r:id="rId37"/>
+    <p:sldId id="378" r:id="rId38"/>
+    <p:sldId id="383" r:id="rId39"/>
+    <p:sldId id="290" r:id="rId40"/>
   </p:sldIdLst>
   <p:sldSz cx="12190413" cy="6859588"/>
   <p:notesSz cx="7099300" cy="10234613"/>
@@ -275,6 +276,7 @@
           <c:dLbls>
             <c:dLbl>
               <c:idx val="3"/>
+              <c:layout/>
               <c:tx>
                 <c:rich>
                   <a:bodyPr/>
@@ -295,7 +297,9 @@
               <c:showPercent val="0"/>
               <c:showBubbleSize val="0"/>
               <c:extLst>
-                <c:ext xmlns:c15="http://schemas.microsoft.com/office/drawing/2012/chart" uri="{CE6537A1-D6FC-4f65-9D91-7224C49458BB}"/>
+                <c:ext xmlns:c15="http://schemas.microsoft.com/office/drawing/2012/chart" uri="{CE6537A1-D6FC-4f65-9D91-7224C49458BB}">
+                  <c15:layout/>
+                </c:ext>
               </c:extLst>
             </c:dLbl>
             <c:spPr>
@@ -324,6 +328,7 @@
             <c:showLeaderLines val="0"/>
             <c:extLst>
               <c:ext xmlns:c15="http://schemas.microsoft.com/office/drawing/2012/chart" uri="{CE6537A1-D6FC-4f65-9D91-7224C49458BB}">
+                <c15:layout/>
                 <c15:showLeaderLines val="0"/>
               </c:ext>
             </c:extLst>
@@ -381,11 +386,11 @@
         </c:dLbls>
         <c:gapWidth val="24"/>
         <c:overlap val="100"/>
-        <c:axId val="291504584"/>
-        <c:axId val="291504976"/>
+        <c:axId val="361889352"/>
+        <c:axId val="361888960"/>
       </c:barChart>
       <c:catAx>
-        <c:axId val="291504584"/>
+        <c:axId val="361889352"/>
         <c:scaling>
           <c:orientation val="minMax"/>
         </c:scaling>
@@ -405,7 +410,7 @@
             <a:endParaRPr lang="de-DE"/>
           </a:p>
         </c:txPr>
-        <c:crossAx val="291504976"/>
+        <c:crossAx val="361888960"/>
         <c:crosses val="autoZero"/>
         <c:auto val="1"/>
         <c:lblAlgn val="ctr"/>
@@ -413,7 +418,7 @@
         <c:noMultiLvlLbl val="0"/>
       </c:catAx>
       <c:valAx>
-        <c:axId val="291504976"/>
+        <c:axId val="361888960"/>
         <c:scaling>
           <c:orientation val="minMax"/>
         </c:scaling>
@@ -423,7 +428,7 @@
         <c:majorTickMark val="out"/>
         <c:minorTickMark val="none"/>
         <c:tickLblPos val="none"/>
-        <c:crossAx val="291504584"/>
+        <c:crossAx val="361889352"/>
         <c:crosses val="autoZero"/>
         <c:crossBetween val="between"/>
       </c:valAx>
@@ -545,7 +550,7 @@
               <a:pPr>
                 <a:defRPr/>
               </a:pPr>
-              <a:t>25.09.2015</a:t>
+              <a:t>27.09.2015</a:t>
             </a:fld>
             <a:endParaRPr lang="de-DE"/>
           </a:p>
@@ -744,7 +749,7 @@
               <a:pPr>
                 <a:defRPr/>
               </a:pPr>
-              <a:t>2015-09-25</a:t>
+              <a:t>2015-09-27</a:t>
             </a:fld>
             <a:endParaRPr lang="sv-SE"/>
           </a:p>
@@ -2602,7 +2607,7 @@
     </p:spTree>
     <p:extLst>
       <p:ext uri="{BB962C8B-B14F-4D97-AF65-F5344CB8AC3E}">
-        <p14:creationId xmlns:p14="http://schemas.microsoft.com/office/powerpoint/2010/main" val="266167733"/>
+        <p14:creationId xmlns:p14="http://schemas.microsoft.com/office/powerpoint/2010/main" val="4082738090"/>
       </p:ext>
     </p:extLst>
   </p:cSld>
@@ -2818,6 +2823,96 @@
       </p:grpSpPr>
       <p:sp>
         <p:nvSpPr>
+          <p:cNvPr id="2" name="Folienbildplatzhalter 1"/>
+          <p:cNvSpPr>
+            <a:spLocks noGrp="1" noRot="1" noChangeAspect="1"/>
+          </p:cNvSpPr>
+          <p:nvPr>
+            <p:ph type="sldImg"/>
+          </p:nvPr>
+        </p:nvSpPr>
+        <p:spPr/>
+      </p:sp>
+      <p:sp>
+        <p:nvSpPr>
+          <p:cNvPr id="3" name="Notizenplatzhalter 2"/>
+          <p:cNvSpPr>
+            <a:spLocks noGrp="1"/>
+          </p:cNvSpPr>
+          <p:nvPr>
+            <p:ph type="body" idx="1"/>
+          </p:nvPr>
+        </p:nvSpPr>
+        <p:spPr/>
+        <p:txBody>
+          <a:bodyPr/>
+          <a:lstStyle/>
+          <a:p>
+            <a:endParaRPr lang="de-DE" dirty="0"/>
+          </a:p>
+        </p:txBody>
+      </p:sp>
+      <p:sp>
+        <p:nvSpPr>
+          <p:cNvPr id="4" name="Foliennummernplatzhalter 3"/>
+          <p:cNvSpPr>
+            <a:spLocks noGrp="1"/>
+          </p:cNvSpPr>
+          <p:nvPr>
+            <p:ph type="sldNum" sz="quarter" idx="10"/>
+          </p:nvPr>
+        </p:nvSpPr>
+        <p:spPr/>
+        <p:txBody>
+          <a:bodyPr/>
+          <a:lstStyle/>
+          <a:p>
+            <a:pPr>
+              <a:defRPr/>
+            </a:pPr>
+            <a:fld id="{9FD97EF8-451C-4BD4-A577-78C919C344DB}" type="slidenum">
+              <a:rPr lang="sv-SE" smtClean="0"/>
+              <a:pPr>
+                <a:defRPr/>
+              </a:pPr>
+              <a:t>27</a:t>
+            </a:fld>
+            <a:endParaRPr lang="sv-SE"/>
+          </a:p>
+        </p:txBody>
+      </p:sp>
+    </p:spTree>
+    <p:extLst>
+      <p:ext uri="{BB962C8B-B14F-4D97-AF65-F5344CB8AC3E}">
+        <p14:creationId xmlns:p14="http://schemas.microsoft.com/office/powerpoint/2010/main" val="313538318"/>
+      </p:ext>
+    </p:extLst>
+  </p:cSld>
+  <p:clrMapOvr>
+    <a:masterClrMapping/>
+  </p:clrMapOvr>
+</p:notes>
+</file>
+
+<file path=ppt/notesSlides/notesSlide23.xml><?xml version="1.0" encoding="utf-8"?>
+<p:notes xmlns:a="http://schemas.openxmlformats.org/drawingml/2006/main" xmlns:r="http://schemas.openxmlformats.org/officeDocument/2006/relationships" xmlns:p="http://schemas.openxmlformats.org/presentationml/2006/main">
+  <p:cSld>
+    <p:spTree>
+      <p:nvGrpSpPr>
+        <p:cNvPr id="1" name=""/>
+        <p:cNvGrpSpPr/>
+        <p:nvPr/>
+      </p:nvGrpSpPr>
+      <p:grpSpPr>
+        <a:xfrm>
+          <a:off x="0" y="0"/>
+          <a:ext cx="0" cy="0"/>
+          <a:chOff x="0" y="0"/>
+          <a:chExt cx="0" cy="0"/>
+        </a:xfrm>
+      </p:grpSpPr>
+      <p:sp>
+        <p:nvSpPr>
           <p:cNvPr id="35842" name="Folienbildplatzhalter 1"/>
           <p:cNvSpPr>
             <a:spLocks noGrp="1" noRot="1" noChangeAspect="1" noTextEdit="1"/>
@@ -2890,7 +2985,7 @@
               <a:pPr>
                 <a:defRPr/>
               </a:pPr>
-              <a:t>38</a:t>
+              <a:t>39</a:t>
             </a:fld>
             <a:endParaRPr lang="sv-SE"/>
           </a:p>
@@ -3009,7 +3104,7 @@
     </p:spTree>
     <p:extLst>
       <p:ext uri="{BB962C8B-B14F-4D97-AF65-F5344CB8AC3E}">
-        <p14:creationId xmlns:p14="http://schemas.microsoft.com/office/powerpoint/2010/main" val="1492577752"/>
+        <p14:creationId xmlns:p14="http://schemas.microsoft.com/office/powerpoint/2010/main" val="2154834536"/>
       </p:ext>
     </p:extLst>
   </p:cSld>
@@ -16949,6 +17044,53 @@
           <a:chExt cx="0" cy="0"/>
         </a:xfrm>
       </p:grpSpPr>
+      <p:pic>
+        <p:nvPicPr>
+          <p:cNvPr id="6" name="Picture 6"/>
+          <p:cNvPicPr>
+            <a:picLocks noChangeAspect="1" noChangeArrowheads="1"/>
+          </p:cNvPicPr>
+          <p:nvPr/>
+        </p:nvPicPr>
+        <p:blipFill>
+          <a:blip r:embed="rId3">
+            <a:extLst>
+              <a:ext uri="{28A0092B-C50C-407E-A947-70E740481C1C}">
+                <a14:useLocalDpi xmlns:a14="http://schemas.microsoft.com/office/drawing/2010/main" val="0"/>
+              </a:ext>
+            </a:extLst>
+          </a:blip>
+          <a:stretch>
+            <a:fillRect/>
+          </a:stretch>
+        </p:blipFill>
+        <p:spPr bwMode="auto">
+          <a:xfrm>
+            <a:off x="9009616" y="1341748"/>
+            <a:ext cx="2593501" cy="2593501"/>
+          </a:xfrm>
+          <a:prstGeom prst="rect">
+            <a:avLst/>
+          </a:prstGeom>
+          <a:noFill/>
+          <a:effectLst>
+            <a:outerShdw blurRad="50800" dist="38100" dir="2700000" algn="tl" rotWithShape="0">
+              <a:prstClr val="black">
+                <a:alpha val="40000"/>
+              </a:prstClr>
+            </a:outerShdw>
+          </a:effectLst>
+          <a:extLst>
+            <a:ext uri="{909E8E84-426E-40DD-AFC4-6F175D3DCCD1}">
+              <a14:hiddenFill xmlns:a14="http://schemas.microsoft.com/office/drawing/2010/main">
+                <a:solidFill>
+                  <a:srgbClr val="FFFFFF"/>
+                </a:solidFill>
+              </a14:hiddenFill>
+            </a:ext>
+          </a:extLst>
+        </p:spPr>
+      </p:pic>
       <p:sp>
         <p:nvSpPr>
           <p:cNvPr id="15362" name="Titel 1"/>
@@ -16964,9 +17106,8 @@
           <a:bodyPr/>
           <a:lstStyle/>
           <a:p>
-            <a:pPr eaLnBrk="1" hangingPunct="1"/>
-            <a:r>
-              <a:rPr lang="de-DE" dirty="0" smtClean="0"/>
+            <a:r>
+              <a:rPr lang="de-DE" dirty="0"/>
               <a:t>Constantin Petsch</a:t>
             </a:r>
           </a:p>
@@ -16984,8 +17125,8 @@
         </p:nvSpPr>
         <p:spPr>
           <a:xfrm>
-            <a:off x="587297" y="1341750"/>
-            <a:ext cx="8956753" cy="4173226"/>
+            <a:off x="587297" y="1341749"/>
+            <a:ext cx="8956753" cy="5134465"/>
           </a:xfrm>
         </p:spPr>
         <p:txBody>
@@ -16999,6 +17140,100 @@
                 <a:spcPts val="2400"/>
               </a:spcBef>
             </a:pPr>
+            <a:r>
+              <a:rPr lang="de-DE" dirty="0"/>
+              <a:t>Diplom-Informatiker Univ</a:t>
+            </a:r>
+            <a:r>
+              <a:rPr lang="de-DE" dirty="0" smtClean="0"/>
+              <a:t>.</a:t>
+            </a:r>
+          </a:p>
+          <a:p>
+            <a:pPr>
+              <a:spcBef>
+                <a:spcPts val="2400"/>
+              </a:spcBef>
+            </a:pPr>
+            <a:r>
+              <a:rPr lang="de-DE" dirty="0" smtClean="0"/>
+              <a:t>Team </a:t>
+            </a:r>
+            <a:r>
+              <a:rPr lang="de-DE" dirty="0"/>
+              <a:t>Manager Microsoft </a:t>
+            </a:r>
+            <a:r>
+              <a:rPr lang="de-DE" dirty="0" smtClean="0"/>
+              <a:t>Consulting</a:t>
+            </a:r>
+          </a:p>
+          <a:p>
+            <a:pPr lvl="1">
+              <a:spcBef>
+                <a:spcPts val="2400"/>
+              </a:spcBef>
+            </a:pPr>
+            <a:r>
+              <a:rPr lang="de-DE" dirty="0"/>
+              <a:t>Frankfurt, Stuttgart, München</a:t>
+            </a:r>
+          </a:p>
+          <a:p>
+            <a:pPr lvl="1">
+              <a:spcBef>
+                <a:spcPts val="2400"/>
+              </a:spcBef>
+            </a:pPr>
+            <a:r>
+              <a:rPr lang="de-DE" dirty="0" smtClean="0"/>
+              <a:t>Prozessberatung</a:t>
+            </a:r>
+          </a:p>
+          <a:p>
+            <a:pPr lvl="1">
+              <a:spcBef>
+                <a:spcPts val="2400"/>
+              </a:spcBef>
+            </a:pPr>
+            <a:r>
+              <a:rPr lang="de-DE" dirty="0" smtClean="0"/>
+              <a:t>Technologieberatung für Microsoft-Produkte </a:t>
+            </a:r>
+          </a:p>
+          <a:p>
+            <a:pPr>
+              <a:spcBef>
+                <a:spcPts val="2400"/>
+              </a:spcBef>
+            </a:pPr>
+            <a:r>
+              <a:rPr lang="de-DE" dirty="0"/>
+              <a:t>Microsoft Certified Professional Developer </a:t>
+            </a:r>
+            <a:r>
+              <a:rPr lang="de-DE" dirty="0" smtClean="0"/>
+              <a:t>(MCPD) </a:t>
+            </a:r>
+            <a:r>
+              <a:rPr lang="de-DE" dirty="0"/>
+              <a:t>– Windows Developer .NET </a:t>
+            </a:r>
+            <a:r>
+              <a:rPr lang="de-DE" dirty="0" smtClean="0"/>
+              <a:t>4</a:t>
+            </a:r>
+          </a:p>
+          <a:p>
+            <a:pPr>
+              <a:spcBef>
+                <a:spcPts val="2400"/>
+              </a:spcBef>
+            </a:pPr>
+            <a:r>
+              <a:rPr lang="de-DE" dirty="0" smtClean="0"/>
+              <a:t>Projektmanager (GPM)</a:t>
+            </a:r>
             <a:endParaRPr lang="de-DE" sz="1800" dirty="0" smtClean="0"/>
           </a:p>
         </p:txBody>
@@ -17035,7 +17270,7 @@
     </p:spTree>
     <p:extLst>
       <p:ext uri="{BB962C8B-B14F-4D97-AF65-F5344CB8AC3E}">
-        <p14:creationId xmlns:p14="http://schemas.microsoft.com/office/powerpoint/2010/main" val="3954416759"/>
+        <p14:creationId xmlns:p14="http://schemas.microsoft.com/office/powerpoint/2010/main" val="3960829229"/>
       </p:ext>
     </p:extLst>
   </p:cSld>
@@ -19771,17 +20006,114 @@
           </a:p>
         </p:txBody>
       </p:sp>
-      <p:pic>
-        <p:nvPicPr>
-          <p:cNvPr id="5" name="Inhaltsplatzhalter 4"/>
-          <p:cNvPicPr>
-            <a:picLocks noGrp="1" noChangeAspect="1"/>
-          </p:cNvPicPr>
+      <p:sp>
+        <p:nvSpPr>
+          <p:cNvPr id="7" name="Inhaltsplatzhalter 6"/>
+          <p:cNvSpPr>
+            <a:spLocks noGrp="1"/>
+          </p:cNvSpPr>
           <p:nvPr>
             <p:ph idx="1"/>
           </p:nvPr>
+        </p:nvSpPr>
+        <p:spPr/>
+        <p:txBody>
+          <a:bodyPr/>
+          <a:lstStyle/>
+          <a:p>
+            <a:pPr>
+              <a:lnSpc>
+                <a:spcPct val="150000"/>
+              </a:lnSpc>
+            </a:pPr>
+            <a:r>
+              <a:rPr lang="de-DE" dirty="0" err="1" smtClean="0"/>
+              <a:t>Fotosharing</a:t>
+            </a:r>
+            <a:r>
+              <a:rPr lang="de-DE" dirty="0" smtClean="0"/>
+              <a:t>-App</a:t>
+            </a:r>
+          </a:p>
+          <a:p>
+            <a:pPr lvl="1">
+              <a:lnSpc>
+                <a:spcPct val="150000"/>
+              </a:lnSpc>
+            </a:pPr>
+            <a:r>
+              <a:rPr lang="de-DE" dirty="0" smtClean="0"/>
+              <a:t>Fotos ansehen</a:t>
+            </a:r>
+          </a:p>
+          <a:p>
+            <a:pPr lvl="1">
+              <a:lnSpc>
+                <a:spcPct val="150000"/>
+              </a:lnSpc>
+            </a:pPr>
+            <a:r>
+              <a:rPr lang="de-DE" dirty="0" smtClean="0"/>
+              <a:t>Fotos hochladen</a:t>
+            </a:r>
+          </a:p>
+          <a:p>
+            <a:pPr lvl="1">
+              <a:lnSpc>
+                <a:spcPct val="150000"/>
+              </a:lnSpc>
+            </a:pPr>
+            <a:r>
+              <a:rPr lang="de-DE" dirty="0" smtClean="0"/>
+              <a:t>Like-Funktion</a:t>
+            </a:r>
+          </a:p>
+          <a:p>
+            <a:pPr>
+              <a:lnSpc>
+                <a:spcPct val="150000"/>
+              </a:lnSpc>
+            </a:pPr>
+            <a:r>
+              <a:rPr lang="de-DE" dirty="0" smtClean="0"/>
+              <a:t>Web-Admin-Oberfläche</a:t>
+            </a:r>
+          </a:p>
+        </p:txBody>
+      </p:sp>
+      <p:sp>
+        <p:nvSpPr>
+          <p:cNvPr id="4" name="Foliennummernplatzhalter 3"/>
+          <p:cNvSpPr>
+            <a:spLocks noGrp="1"/>
+          </p:cNvSpPr>
+          <p:nvPr>
+            <p:ph type="sldNum" sz="quarter" idx="12"/>
+          </p:nvPr>
+        </p:nvSpPr>
+        <p:spPr/>
+        <p:txBody>
+          <a:bodyPr/>
+          <a:lstStyle/>
+          <a:p>
+            <a:fld id="{8F35CB8A-22DD-4279-9E9E-A49CDB5FBE56}" type="slidenum">
+              <a:rPr lang="en-US" smtClean="0"/>
+              <a:pPr/>
+              <a:t>26</a:t>
+            </a:fld>
+            <a:endParaRPr lang="en-US"/>
+          </a:p>
+        </p:txBody>
+      </p:sp>
+      <p:pic>
+        <p:nvPicPr>
+          <p:cNvPr id="9" name="Grafik 8"/>
+          <p:cNvPicPr>
+            <a:picLocks noChangeAspect="1"/>
+          </p:cNvPicPr>
+          <p:nvPr/>
         </p:nvPicPr>
-        <p:blipFill>
+        <p:blipFill rotWithShape="1">
           <a:blip r:embed="rId3">
             <a:extLst>
               <a:ext uri="{28A0092B-C50C-407E-A947-70E740481C1C}">
@@ -19789,65 +20121,13 @@
               </a:ext>
             </a:extLst>
           </a:blip>
-          <a:stretch>
-            <a:fillRect/>
-          </a:stretch>
+          <a:srcRect l="7955" t="9923" r="65654" b="9833"/>
+          <a:stretch/>
         </p:blipFill>
         <p:spPr>
           <a:xfrm>
-            <a:off x="1917875" y="1975419"/>
-            <a:ext cx="8306959" cy="3219899"/>
-          </a:xfrm>
-        </p:spPr>
-      </p:pic>
-      <p:sp>
-        <p:nvSpPr>
-          <p:cNvPr id="4" name="Foliennummernplatzhalter 3"/>
-          <p:cNvSpPr>
-            <a:spLocks noGrp="1"/>
-          </p:cNvSpPr>
-          <p:nvPr>
-            <p:ph type="sldNum" sz="quarter" idx="12"/>
-          </p:nvPr>
-        </p:nvSpPr>
-        <p:spPr/>
-        <p:txBody>
-          <a:bodyPr/>
-          <a:lstStyle/>
-          <a:p>
-            <a:fld id="{8F35CB8A-22DD-4279-9E9E-A49CDB5FBE56}" type="slidenum">
-              <a:rPr lang="en-US" smtClean="0"/>
-              <a:pPr/>
-              <a:t>26</a:t>
-            </a:fld>
-            <a:endParaRPr lang="en-US"/>
-          </a:p>
-        </p:txBody>
-      </p:sp>
-      <p:pic>
-        <p:nvPicPr>
-          <p:cNvPr id="3" name="Grafik 2"/>
-          <p:cNvPicPr>
-            <a:picLocks noChangeAspect="1"/>
-          </p:cNvPicPr>
-          <p:nvPr/>
-        </p:nvPicPr>
-        <p:blipFill>
-          <a:blip r:embed="rId4">
-            <a:extLst>
-              <a:ext uri="{28A0092B-C50C-407E-A947-70E740481C1C}">
-                <a14:useLocalDpi xmlns:a14="http://schemas.microsoft.com/office/drawing/2010/main" val="0"/>
-              </a:ext>
-            </a:extLst>
-          </a:blip>
-          <a:stretch>
-            <a:fillRect/>
-          </a:stretch>
-        </p:blipFill>
-        <p:spPr>
-          <a:xfrm>
-            <a:off x="1870279" y="1710291"/>
-            <a:ext cx="8449854" cy="3439005"/>
+            <a:off x="6781800" y="1044870"/>
+            <a:ext cx="2981325" cy="5098997"/>
           </a:xfrm>
           <a:prstGeom prst="rect">
             <a:avLst/>
@@ -19901,6 +20181,142 @@
           <a:p>
             <a:r>
               <a:rPr lang="de-DE" dirty="0" smtClean="0"/>
+              <a:t>1. Big Picture</a:t>
+            </a:r>
+            <a:endParaRPr lang="de-DE" dirty="0"/>
+          </a:p>
+        </p:txBody>
+      </p:sp>
+      <p:pic>
+        <p:nvPicPr>
+          <p:cNvPr id="5" name="Inhaltsplatzhalter 4"/>
+          <p:cNvPicPr>
+            <a:picLocks noGrp="1" noChangeAspect="1"/>
+          </p:cNvPicPr>
+          <p:nvPr>
+            <p:ph idx="1"/>
+          </p:nvPr>
+        </p:nvPicPr>
+        <p:blipFill>
+          <a:blip r:embed="rId3">
+            <a:extLst>
+              <a:ext uri="{28A0092B-C50C-407E-A947-70E740481C1C}">
+                <a14:useLocalDpi xmlns:a14="http://schemas.microsoft.com/office/drawing/2010/main" val="0"/>
+              </a:ext>
+            </a:extLst>
+          </a:blip>
+          <a:stretch>
+            <a:fillRect/>
+          </a:stretch>
+        </p:blipFill>
+        <p:spPr>
+          <a:xfrm>
+            <a:off x="1917875" y="1975419"/>
+            <a:ext cx="8306959" cy="3219899"/>
+          </a:xfrm>
+        </p:spPr>
+      </p:pic>
+      <p:sp>
+        <p:nvSpPr>
+          <p:cNvPr id="4" name="Foliennummernplatzhalter 3"/>
+          <p:cNvSpPr>
+            <a:spLocks noGrp="1"/>
+          </p:cNvSpPr>
+          <p:nvPr>
+            <p:ph type="sldNum" sz="quarter" idx="12"/>
+          </p:nvPr>
+        </p:nvSpPr>
+        <p:spPr/>
+        <p:txBody>
+          <a:bodyPr/>
+          <a:lstStyle/>
+          <a:p>
+            <a:fld id="{8F35CB8A-22DD-4279-9E9E-A49CDB5FBE56}" type="slidenum">
+              <a:rPr lang="en-US" smtClean="0"/>
+              <a:pPr/>
+              <a:t>27</a:t>
+            </a:fld>
+            <a:endParaRPr lang="en-US"/>
+          </a:p>
+        </p:txBody>
+      </p:sp>
+      <p:pic>
+        <p:nvPicPr>
+          <p:cNvPr id="3" name="Grafik 2"/>
+          <p:cNvPicPr>
+            <a:picLocks noChangeAspect="1"/>
+          </p:cNvPicPr>
+          <p:nvPr/>
+        </p:nvPicPr>
+        <p:blipFill>
+          <a:blip r:embed="rId4">
+            <a:extLst>
+              <a:ext uri="{28A0092B-C50C-407E-A947-70E740481C1C}">
+                <a14:useLocalDpi xmlns:a14="http://schemas.microsoft.com/office/drawing/2010/main" val="0"/>
+              </a:ext>
+            </a:extLst>
+          </a:blip>
+          <a:stretch>
+            <a:fillRect/>
+          </a:stretch>
+        </p:blipFill>
+        <p:spPr>
+          <a:xfrm>
+            <a:off x="1870279" y="1710291"/>
+            <a:ext cx="8449854" cy="3439005"/>
+          </a:xfrm>
+          <a:prstGeom prst="rect">
+            <a:avLst/>
+          </a:prstGeom>
+        </p:spPr>
+      </p:pic>
+    </p:spTree>
+    <p:extLst>
+      <p:ext uri="{BB962C8B-B14F-4D97-AF65-F5344CB8AC3E}">
+        <p14:creationId xmlns:p14="http://schemas.microsoft.com/office/powerpoint/2010/main" val="1015993830"/>
+      </p:ext>
+    </p:extLst>
+  </p:cSld>
+  <p:clrMapOvr>
+    <a:masterClrMapping/>
+  </p:clrMapOvr>
+</p:sld>
+</file>
+
+<file path=ppt/slides/slide28.xml><?xml version="1.0" encoding="utf-8"?>
+<p:sld xmlns:a="http://schemas.openxmlformats.org/drawingml/2006/main" xmlns:r="http://schemas.openxmlformats.org/officeDocument/2006/relationships" xmlns:p="http://schemas.openxmlformats.org/presentationml/2006/main">
+  <p:cSld>
+    <p:spTree>
+      <p:nvGrpSpPr>
+        <p:cNvPr id="1" name=""/>
+        <p:cNvGrpSpPr/>
+        <p:nvPr/>
+      </p:nvGrpSpPr>
+      <p:grpSpPr>
+        <a:xfrm>
+          <a:off x="0" y="0"/>
+          <a:ext cx="0" cy="0"/>
+          <a:chOff x="0" y="0"/>
+          <a:chExt cx="0" cy="0"/>
+        </a:xfrm>
+      </p:grpSpPr>
+      <p:sp>
+        <p:nvSpPr>
+          <p:cNvPr id="2" name="Titel 1"/>
+          <p:cNvSpPr>
+            <a:spLocks noGrp="1"/>
+          </p:cNvSpPr>
+          <p:nvPr>
+            <p:ph type="title"/>
+          </p:nvPr>
+        </p:nvSpPr>
+        <p:spPr/>
+        <p:txBody>
+          <a:bodyPr/>
+          <a:lstStyle/>
+          <a:p>
+            <a:r>
+              <a:rPr lang="de-DE" dirty="0" smtClean="0"/>
               <a:t>1. Big Picture – Tag 1</a:t>
             </a:r>
             <a:endParaRPr lang="de-DE" dirty="0"/>
@@ -19954,7 +20370,7 @@
             <a:fld id="{8F35CB8A-22DD-4279-9E9E-A49CDB5FBE56}" type="slidenum">
               <a:rPr lang="en-US" smtClean="0"/>
               <a:pPr/>
-              <a:t>27</a:t>
+              <a:t>28</a:t>
             </a:fld>
             <a:endParaRPr lang="en-US"/>
           </a:p>
@@ -20075,7 +20491,7 @@
 </p:sld>
 </file>
 
-<file path=ppt/slides/slide28.xml><?xml version="1.0" encoding="utf-8"?>
+<file path=ppt/slides/slide29.xml><?xml version="1.0" encoding="utf-8"?>
 <p:sld xmlns:a="http://schemas.openxmlformats.org/drawingml/2006/main" xmlns:r="http://schemas.openxmlformats.org/officeDocument/2006/relationships" xmlns:p="http://schemas.openxmlformats.org/presentationml/2006/main">
   <p:cSld>
     <p:spTree>
@@ -20162,7 +20578,7 @@
             <a:fld id="{8F35CB8A-22DD-4279-9E9E-A49CDB5FBE56}" type="slidenum">
               <a:rPr lang="en-US" smtClean="0"/>
               <a:pPr/>
-              <a:t>28</a:t>
+              <a:t>29</a:t>
             </a:fld>
             <a:endParaRPr lang="en-US"/>
           </a:p>
@@ -20326,214 +20742,6 @@
     <p:extLst>
       <p:ext uri="{BB962C8B-B14F-4D97-AF65-F5344CB8AC3E}">
         <p14:creationId xmlns:p14="http://schemas.microsoft.com/office/powerpoint/2010/main" val="3458087678"/>
-      </p:ext>
-    </p:extLst>
-  </p:cSld>
-  <p:clrMapOvr>
-    <a:masterClrMapping/>
-  </p:clrMapOvr>
-</p:sld>
-</file>
-
-<file path=ppt/slides/slide29.xml><?xml version="1.0" encoding="utf-8"?>
-<p:sld xmlns:a="http://schemas.openxmlformats.org/drawingml/2006/main" xmlns:r="http://schemas.openxmlformats.org/officeDocument/2006/relationships" xmlns:p="http://schemas.openxmlformats.org/presentationml/2006/main">
-  <p:cSld>
-    <p:spTree>
-      <p:nvGrpSpPr>
-        <p:cNvPr id="1" name=""/>
-        <p:cNvGrpSpPr/>
-        <p:nvPr/>
-      </p:nvGrpSpPr>
-      <p:grpSpPr>
-        <a:xfrm>
-          <a:off x="0" y="0"/>
-          <a:ext cx="0" cy="0"/>
-          <a:chOff x="0" y="0"/>
-          <a:chExt cx="0" cy="0"/>
-        </a:xfrm>
-      </p:grpSpPr>
-      <p:sp>
-        <p:nvSpPr>
-          <p:cNvPr id="2" name="Titel 1"/>
-          <p:cNvSpPr>
-            <a:spLocks noGrp="1"/>
-          </p:cNvSpPr>
-          <p:nvPr>
-            <p:ph type="title"/>
-          </p:nvPr>
-        </p:nvSpPr>
-        <p:spPr/>
-        <p:txBody>
-          <a:bodyPr/>
-          <a:lstStyle/>
-          <a:p>
-            <a:r>
-              <a:rPr lang="de-DE" dirty="0" smtClean="0"/>
-              <a:t>1. Big Picture – Tag 3</a:t>
-            </a:r>
-            <a:endParaRPr lang="de-DE" dirty="0"/>
-          </a:p>
-        </p:txBody>
-      </p:sp>
-      <p:pic>
-        <p:nvPicPr>
-          <p:cNvPr id="5" name="Inhaltsplatzhalter 4"/>
-          <p:cNvPicPr>
-            <a:picLocks noGrp="1" noChangeAspect="1"/>
-          </p:cNvPicPr>
-          <p:nvPr>
-            <p:ph idx="1"/>
-          </p:nvPr>
-        </p:nvPicPr>
-        <p:blipFill>
-          <a:blip r:embed="rId2">
-            <a:extLst>
-              <a:ext uri="{28A0092B-C50C-407E-A947-70E740481C1C}">
-                <a14:useLocalDpi xmlns:a14="http://schemas.microsoft.com/office/drawing/2010/main" val="0"/>
-              </a:ext>
-            </a:extLst>
-          </a:blip>
-          <a:stretch>
-            <a:fillRect/>
-          </a:stretch>
-        </p:blipFill>
-        <p:spPr>
-          <a:xfrm>
-            <a:off x="2115606" y="2499294"/>
-            <a:ext cx="7911496" cy="3219899"/>
-          </a:xfrm>
-        </p:spPr>
-      </p:pic>
-      <p:sp>
-        <p:nvSpPr>
-          <p:cNvPr id="4" name="Foliennummernplatzhalter 3"/>
-          <p:cNvSpPr>
-            <a:spLocks noGrp="1"/>
-          </p:cNvSpPr>
-          <p:nvPr>
-            <p:ph type="sldNum" sz="quarter" idx="12"/>
-          </p:nvPr>
-        </p:nvSpPr>
-        <p:spPr/>
-        <p:txBody>
-          <a:bodyPr/>
-          <a:lstStyle/>
-          <a:p>
-            <a:fld id="{8F35CB8A-22DD-4279-9E9E-A49CDB5FBE56}" type="slidenum">
-              <a:rPr lang="en-US" smtClean="0"/>
-              <a:pPr/>
-              <a:t>29</a:t>
-            </a:fld>
-            <a:endParaRPr lang="en-US"/>
-          </a:p>
-        </p:txBody>
-      </p:sp>
-      <p:sp>
-        <p:nvSpPr>
-          <p:cNvPr id="6" name="Pfeil nach unten 5"/>
-          <p:cNvSpPr/>
-          <p:nvPr/>
-        </p:nvSpPr>
-        <p:spPr>
-          <a:xfrm>
-            <a:off x="3257550" y="1485900"/>
-            <a:ext cx="657873" cy="877164"/>
-          </a:xfrm>
-          <a:prstGeom prst="downArrow">
-            <a:avLst/>
-          </a:prstGeom>
-          <a:solidFill>
-            <a:schemeClr val="accent3"/>
-          </a:solidFill>
-          <a:ln>
-            <a:noFill/>
-          </a:ln>
-        </p:spPr>
-        <p:style>
-          <a:lnRef idx="2">
-            <a:schemeClr val="accent1">
-              <a:shade val="50000"/>
-            </a:schemeClr>
-          </a:lnRef>
-          <a:fillRef idx="1">
-            <a:schemeClr val="accent1"/>
-          </a:fillRef>
-          <a:effectRef idx="0">
-            <a:schemeClr val="accent1"/>
-          </a:effectRef>
-          <a:fontRef idx="minor">
-            <a:schemeClr val="lt1"/>
-          </a:fontRef>
-        </p:style>
-        <p:txBody>
-          <a:bodyPr rtlCol="0" anchor="ctr"/>
-          <a:lstStyle/>
-          <a:p>
-            <a:pPr algn="ctr"/>
-            <a:endParaRPr lang="de-DE" sz="1400" dirty="0" err="1" smtClean="0">
-              <a:solidFill>
-                <a:schemeClr val="accent3"/>
-              </a:solidFill>
-            </a:endParaRPr>
-          </a:p>
-        </p:txBody>
-      </p:sp>
-      <p:sp>
-        <p:nvSpPr>
-          <p:cNvPr id="7" name="Rechteck 6"/>
-          <p:cNvSpPr/>
-          <p:nvPr/>
-        </p:nvSpPr>
-        <p:spPr>
-          <a:xfrm>
-            <a:off x="5114925" y="1924482"/>
-            <a:ext cx="5086350" cy="4333875"/>
-          </a:xfrm>
-          <a:prstGeom prst="rect">
-            <a:avLst/>
-          </a:prstGeom>
-          <a:solidFill>
-            <a:srgbClr val="FFFFFF">
-              <a:alpha val="69804"/>
-            </a:srgbClr>
-          </a:solidFill>
-          <a:ln>
-            <a:noFill/>
-          </a:ln>
-        </p:spPr>
-        <p:style>
-          <a:lnRef idx="2">
-            <a:schemeClr val="accent1">
-              <a:shade val="50000"/>
-            </a:schemeClr>
-          </a:lnRef>
-          <a:fillRef idx="1">
-            <a:schemeClr val="accent1"/>
-          </a:fillRef>
-          <a:effectRef idx="0">
-            <a:schemeClr val="accent1"/>
-          </a:effectRef>
-          <a:fontRef idx="minor">
-            <a:schemeClr val="lt1"/>
-          </a:fontRef>
-        </p:style>
-        <p:txBody>
-          <a:bodyPr rtlCol="0" anchor="ctr"/>
-          <a:lstStyle/>
-          <a:p>
-            <a:pPr algn="ctr"/>
-            <a:endParaRPr lang="de-DE" sz="1400" dirty="0" err="1" smtClean="0">
-              <a:solidFill>
-                <a:schemeClr val="accent3"/>
-              </a:solidFill>
-            </a:endParaRPr>
-          </a:p>
-        </p:txBody>
-      </p:sp>
-    </p:spTree>
-    <p:extLst>
-      <p:ext uri="{BB962C8B-B14F-4D97-AF65-F5344CB8AC3E}">
-        <p14:creationId xmlns:p14="http://schemas.microsoft.com/office/powerpoint/2010/main" val="526558436"/>
       </p:ext>
     </p:extLst>
   </p:cSld>
@@ -20575,11 +20783,11 @@
           <a:bodyPr/>
           <a:lstStyle/>
           <a:p>
-            <a:pPr eaLnBrk="1" hangingPunct="1"/>
-            <a:r>
-              <a:rPr lang="de-DE" dirty="0" smtClean="0"/>
+            <a:r>
+              <a:rPr lang="de-DE" dirty="0"/>
               <a:t>Felix Radzanowski</a:t>
             </a:r>
+            <a:endParaRPr lang="de-DE" dirty="0" smtClean="0"/>
           </a:p>
         </p:txBody>
       </p:sp>
@@ -20595,8 +20803,8 @@
         </p:nvSpPr>
         <p:spPr>
           <a:xfrm>
-            <a:off x="587297" y="1341750"/>
-            <a:ext cx="8956753" cy="4173226"/>
+            <a:off x="587297" y="1341749"/>
+            <a:ext cx="8956753" cy="5134465"/>
           </a:xfrm>
         </p:spPr>
         <p:txBody>
@@ -20610,7 +20818,100 @@
                 <a:spcPts val="2400"/>
               </a:spcBef>
             </a:pPr>
-            <a:endParaRPr lang="de-DE" sz="1800" dirty="0" smtClean="0"/>
+            <a:r>
+              <a:rPr lang="de-DE" dirty="0" smtClean="0"/>
+              <a:t>Bachelor </a:t>
+            </a:r>
+            <a:r>
+              <a:rPr lang="de-DE" dirty="0" err="1" smtClean="0"/>
+              <a:t>of</a:t>
+            </a:r>
+            <a:r>
+              <a:rPr lang="de-DE" dirty="0" smtClean="0"/>
+              <a:t> Science Software-Engineering</a:t>
+            </a:r>
+          </a:p>
+          <a:p>
+            <a:pPr>
+              <a:spcBef>
+                <a:spcPts val="2400"/>
+              </a:spcBef>
+            </a:pPr>
+            <a:r>
+              <a:rPr lang="de-DE" dirty="0" smtClean="0"/>
+              <a:t>Ehemals </a:t>
+            </a:r>
+            <a:r>
+              <a:rPr lang="de-DE" dirty="0" err="1" smtClean="0"/>
+              <a:t>Bachelorand</a:t>
+            </a:r>
+            <a:r>
+              <a:rPr lang="de-DE" dirty="0" smtClean="0"/>
+              <a:t> bei Acando </a:t>
+            </a:r>
+          </a:p>
+          <a:p>
+            <a:pPr>
+              <a:spcBef>
+                <a:spcPts val="2400"/>
+              </a:spcBef>
+            </a:pPr>
+            <a:r>
+              <a:rPr lang="de-DE" dirty="0" smtClean="0"/>
+              <a:t>IT-Consultant im Bereich Microsoft</a:t>
+            </a:r>
+          </a:p>
+          <a:p>
+            <a:pPr lvl="1">
+              <a:spcBef>
+                <a:spcPts val="2400"/>
+              </a:spcBef>
+            </a:pPr>
+            <a:r>
+              <a:rPr lang="de-DE" dirty="0" smtClean="0"/>
+              <a:t>ASP.NET</a:t>
+            </a:r>
+          </a:p>
+          <a:p>
+            <a:pPr lvl="1">
+              <a:spcBef>
+                <a:spcPts val="2400"/>
+              </a:spcBef>
+            </a:pPr>
+            <a:r>
+              <a:rPr lang="de-DE" sz="1600" dirty="0" smtClean="0"/>
+              <a:t>.NET Custom Development </a:t>
+            </a:r>
+          </a:p>
+          <a:p>
+            <a:pPr lvl="1">
+              <a:spcBef>
+                <a:spcPts val="2400"/>
+              </a:spcBef>
+            </a:pPr>
+            <a:r>
+              <a:rPr lang="de-DE" dirty="0" smtClean="0"/>
+              <a:t>SharePoint</a:t>
+            </a:r>
+          </a:p>
+          <a:p>
+            <a:pPr lvl="1">
+              <a:spcBef>
+                <a:spcPts val="2400"/>
+              </a:spcBef>
+            </a:pPr>
+            <a:r>
+              <a:rPr lang="de-DE" dirty="0" smtClean="0"/>
+              <a:t>JavaScript, </a:t>
+            </a:r>
+            <a:r>
+              <a:rPr lang="de-DE" dirty="0" err="1" smtClean="0"/>
+              <a:t>Durandal</a:t>
+            </a:r>
+            <a:r>
+              <a:rPr lang="de-DE" dirty="0" smtClean="0"/>
+              <a:t>, KnockoutJS</a:t>
+            </a:r>
           </a:p>
         </p:txBody>
       </p:sp>
@@ -20643,10 +20944,41 @@
           </a:p>
         </p:txBody>
       </p:sp>
+      <p:pic>
+        <p:nvPicPr>
+          <p:cNvPr id="3" name="Grafik 2"/>
+          <p:cNvPicPr>
+            <a:picLocks noChangeAspect="1"/>
+          </p:cNvPicPr>
+          <p:nvPr/>
+        </p:nvPicPr>
+        <p:blipFill>
+          <a:blip r:embed="rId3"/>
+          <a:stretch>
+            <a:fillRect/>
+          </a:stretch>
+        </p:blipFill>
+        <p:spPr>
+          <a:xfrm>
+            <a:off x="8981577" y="1341438"/>
+            <a:ext cx="2573836" cy="2573836"/>
+          </a:xfrm>
+          <a:prstGeom prst="rect">
+            <a:avLst/>
+          </a:prstGeom>
+          <a:effectLst>
+            <a:outerShdw blurRad="50800" dist="38100" dir="2700000" algn="tl" rotWithShape="0">
+              <a:prstClr val="black">
+                <a:alpha val="40000"/>
+              </a:prstClr>
+            </a:outerShdw>
+          </a:effectLst>
+        </p:spPr>
+      </p:pic>
     </p:spTree>
     <p:extLst>
       <p:ext uri="{BB962C8B-B14F-4D97-AF65-F5344CB8AC3E}">
-        <p14:creationId xmlns:p14="http://schemas.microsoft.com/office/powerpoint/2010/main" val="3203999184"/>
+        <p14:creationId xmlns:p14="http://schemas.microsoft.com/office/powerpoint/2010/main" val="448963903"/>
       </p:ext>
     </p:extLst>
   </p:cSld>
@@ -20682,7 +21014,7 @@
       </p:grpSpPr>
       <p:sp>
         <p:nvSpPr>
-          <p:cNvPr id="8" name="Titel 7"/>
+          <p:cNvPr id="2" name="Titel 1"/>
           <p:cNvSpPr>
             <a:spLocks noGrp="1"/>
           </p:cNvSpPr>
@@ -20697,62 +21029,41 @@
           <a:p>
             <a:r>
               <a:rPr lang="de-DE" dirty="0" smtClean="0"/>
-              <a:t>2. Demos</a:t>
+              <a:t>1. Big Picture – Tag 3</a:t>
             </a:r>
             <a:endParaRPr lang="de-DE" dirty="0"/>
           </a:p>
         </p:txBody>
       </p:sp>
-      <p:sp>
-        <p:nvSpPr>
-          <p:cNvPr id="9" name="Inhaltsplatzhalter 8"/>
-          <p:cNvSpPr>
-            <a:spLocks noGrp="1"/>
-          </p:cNvSpPr>
+      <p:pic>
+        <p:nvPicPr>
+          <p:cNvPr id="5" name="Inhaltsplatzhalter 4"/>
+          <p:cNvPicPr>
+            <a:picLocks noGrp="1" noChangeAspect="1"/>
+          </p:cNvPicPr>
           <p:nvPr>
             <p:ph idx="1"/>
           </p:nvPr>
-        </p:nvSpPr>
-        <p:spPr/>
-        <p:txBody>
-          <a:bodyPr/>
-          <a:lstStyle/>
-          <a:p>
-            <a:pPr>
-              <a:lnSpc>
-                <a:spcPct val="150000"/>
-              </a:lnSpc>
-            </a:pPr>
-            <a:r>
-              <a:rPr lang="de-DE" dirty="0" smtClean="0"/>
-              <a:t>Web-Admin-Oberfläche (ASP.NET MVC)</a:t>
-            </a:r>
-          </a:p>
-          <a:p>
-            <a:pPr>
-              <a:lnSpc>
-                <a:spcPct val="150000"/>
-              </a:lnSpc>
-            </a:pPr>
-            <a:r>
-              <a:rPr lang="de-DE" dirty="0" smtClean="0"/>
-              <a:t>Schnittstelle/API (ASP.NET Web API)</a:t>
-            </a:r>
-          </a:p>
-          <a:p>
-            <a:pPr>
-              <a:lnSpc>
-                <a:spcPct val="150000"/>
-              </a:lnSpc>
-            </a:pPr>
-            <a:r>
-              <a:rPr lang="de-DE" dirty="0" smtClean="0"/>
-              <a:t>App (Windows Phone)</a:t>
-            </a:r>
-            <a:endParaRPr lang="de-DE" dirty="0"/>
-          </a:p>
-        </p:txBody>
-      </p:sp>
+        </p:nvPicPr>
+        <p:blipFill>
+          <a:blip r:embed="rId2">
+            <a:extLst>
+              <a:ext uri="{28A0092B-C50C-407E-A947-70E740481C1C}">
+                <a14:useLocalDpi xmlns:a14="http://schemas.microsoft.com/office/drawing/2010/main" val="0"/>
+              </a:ext>
+            </a:extLst>
+          </a:blip>
+          <a:stretch>
+            <a:fillRect/>
+          </a:stretch>
+        </p:blipFill>
+        <p:spPr>
+          <a:xfrm>
+            <a:off x="2115606" y="2499294"/>
+            <a:ext cx="7911496" cy="3219899"/>
+          </a:xfrm>
+        </p:spPr>
+      </p:pic>
       <p:sp>
         <p:nvSpPr>
           <p:cNvPr id="4" name="Foliennummernplatzhalter 3"/>
@@ -20777,10 +21088,112 @@
           </a:p>
         </p:txBody>
       </p:sp>
+      <p:sp>
+        <p:nvSpPr>
+          <p:cNvPr id="6" name="Pfeil nach unten 5"/>
+          <p:cNvSpPr/>
+          <p:nvPr/>
+        </p:nvSpPr>
+        <p:spPr>
+          <a:xfrm>
+            <a:off x="3257550" y="1485900"/>
+            <a:ext cx="657873" cy="877164"/>
+          </a:xfrm>
+          <a:prstGeom prst="downArrow">
+            <a:avLst/>
+          </a:prstGeom>
+          <a:solidFill>
+            <a:schemeClr val="accent3"/>
+          </a:solidFill>
+          <a:ln>
+            <a:noFill/>
+          </a:ln>
+        </p:spPr>
+        <p:style>
+          <a:lnRef idx="2">
+            <a:schemeClr val="accent1">
+              <a:shade val="50000"/>
+            </a:schemeClr>
+          </a:lnRef>
+          <a:fillRef idx="1">
+            <a:schemeClr val="accent1"/>
+          </a:fillRef>
+          <a:effectRef idx="0">
+            <a:schemeClr val="accent1"/>
+          </a:effectRef>
+          <a:fontRef idx="minor">
+            <a:schemeClr val="lt1"/>
+          </a:fontRef>
+        </p:style>
+        <p:txBody>
+          <a:bodyPr rtlCol="0" anchor="ctr"/>
+          <a:lstStyle/>
+          <a:p>
+            <a:pPr algn="ctr"/>
+            <a:endParaRPr lang="de-DE" sz="1400" dirty="0" err="1" smtClean="0">
+              <a:solidFill>
+                <a:schemeClr val="accent3"/>
+              </a:solidFill>
+            </a:endParaRPr>
+          </a:p>
+        </p:txBody>
+      </p:sp>
+      <p:sp>
+        <p:nvSpPr>
+          <p:cNvPr id="7" name="Rechteck 6"/>
+          <p:cNvSpPr/>
+          <p:nvPr/>
+        </p:nvSpPr>
+        <p:spPr>
+          <a:xfrm>
+            <a:off x="5114925" y="1924482"/>
+            <a:ext cx="5086350" cy="4333875"/>
+          </a:xfrm>
+          <a:prstGeom prst="rect">
+            <a:avLst/>
+          </a:prstGeom>
+          <a:solidFill>
+            <a:srgbClr val="FFFFFF">
+              <a:alpha val="69804"/>
+            </a:srgbClr>
+          </a:solidFill>
+          <a:ln>
+            <a:noFill/>
+          </a:ln>
+        </p:spPr>
+        <p:style>
+          <a:lnRef idx="2">
+            <a:schemeClr val="accent1">
+              <a:shade val="50000"/>
+            </a:schemeClr>
+          </a:lnRef>
+          <a:fillRef idx="1">
+            <a:schemeClr val="accent1"/>
+          </a:fillRef>
+          <a:effectRef idx="0">
+            <a:schemeClr val="accent1"/>
+          </a:effectRef>
+          <a:fontRef idx="minor">
+            <a:schemeClr val="lt1"/>
+          </a:fontRef>
+        </p:style>
+        <p:txBody>
+          <a:bodyPr rtlCol="0" anchor="ctr"/>
+          <a:lstStyle/>
+          <a:p>
+            <a:pPr algn="ctr"/>
+            <a:endParaRPr lang="de-DE" sz="1400" dirty="0" err="1" smtClean="0">
+              <a:solidFill>
+                <a:schemeClr val="accent3"/>
+              </a:solidFill>
+            </a:endParaRPr>
+          </a:p>
+        </p:txBody>
+      </p:sp>
     </p:spTree>
     <p:extLst>
       <p:ext uri="{BB962C8B-B14F-4D97-AF65-F5344CB8AC3E}">
-        <p14:creationId xmlns:p14="http://schemas.microsoft.com/office/powerpoint/2010/main" val="2740131491"/>
+        <p14:creationId xmlns:p14="http://schemas.microsoft.com/office/powerpoint/2010/main" val="526558436"/>
       </p:ext>
     </p:extLst>
   </p:cSld>
@@ -20809,6 +21222,133 @@
       </p:grpSpPr>
       <p:sp>
         <p:nvSpPr>
+          <p:cNvPr id="8" name="Titel 7"/>
+          <p:cNvSpPr>
+            <a:spLocks noGrp="1"/>
+          </p:cNvSpPr>
+          <p:nvPr>
+            <p:ph type="title"/>
+          </p:nvPr>
+        </p:nvSpPr>
+        <p:spPr/>
+        <p:txBody>
+          <a:bodyPr/>
+          <a:lstStyle/>
+          <a:p>
+            <a:r>
+              <a:rPr lang="de-DE" dirty="0" smtClean="0"/>
+              <a:t>2. Demos</a:t>
+            </a:r>
+            <a:endParaRPr lang="de-DE" dirty="0"/>
+          </a:p>
+        </p:txBody>
+      </p:sp>
+      <p:sp>
+        <p:nvSpPr>
+          <p:cNvPr id="9" name="Inhaltsplatzhalter 8"/>
+          <p:cNvSpPr>
+            <a:spLocks noGrp="1"/>
+          </p:cNvSpPr>
+          <p:nvPr>
+            <p:ph idx="1"/>
+          </p:nvPr>
+        </p:nvSpPr>
+        <p:spPr/>
+        <p:txBody>
+          <a:bodyPr/>
+          <a:lstStyle/>
+          <a:p>
+            <a:pPr>
+              <a:lnSpc>
+                <a:spcPct val="150000"/>
+              </a:lnSpc>
+            </a:pPr>
+            <a:r>
+              <a:rPr lang="de-DE" dirty="0" smtClean="0"/>
+              <a:t>Web-Admin-Oberfläche (ASP.NET MVC)</a:t>
+            </a:r>
+          </a:p>
+          <a:p>
+            <a:pPr>
+              <a:lnSpc>
+                <a:spcPct val="150000"/>
+              </a:lnSpc>
+            </a:pPr>
+            <a:r>
+              <a:rPr lang="de-DE" dirty="0" smtClean="0"/>
+              <a:t>Schnittstelle/API (ASP.NET Web API)</a:t>
+            </a:r>
+          </a:p>
+          <a:p>
+            <a:pPr>
+              <a:lnSpc>
+                <a:spcPct val="150000"/>
+              </a:lnSpc>
+            </a:pPr>
+            <a:r>
+              <a:rPr lang="de-DE" dirty="0" smtClean="0"/>
+              <a:t>App (Windows Phone)</a:t>
+            </a:r>
+            <a:endParaRPr lang="de-DE" dirty="0"/>
+          </a:p>
+        </p:txBody>
+      </p:sp>
+      <p:sp>
+        <p:nvSpPr>
+          <p:cNvPr id="4" name="Foliennummernplatzhalter 3"/>
+          <p:cNvSpPr>
+            <a:spLocks noGrp="1"/>
+          </p:cNvSpPr>
+          <p:nvPr>
+            <p:ph type="sldNum" sz="quarter" idx="12"/>
+          </p:nvPr>
+        </p:nvSpPr>
+        <p:spPr/>
+        <p:txBody>
+          <a:bodyPr/>
+          <a:lstStyle/>
+          <a:p>
+            <a:fld id="{8F35CB8A-22DD-4279-9E9E-A49CDB5FBE56}" type="slidenum">
+              <a:rPr lang="en-US" smtClean="0"/>
+              <a:pPr/>
+              <a:t>31</a:t>
+            </a:fld>
+            <a:endParaRPr lang="en-US"/>
+          </a:p>
+        </p:txBody>
+      </p:sp>
+    </p:spTree>
+    <p:extLst>
+      <p:ext uri="{BB962C8B-B14F-4D97-AF65-F5344CB8AC3E}">
+        <p14:creationId xmlns:p14="http://schemas.microsoft.com/office/powerpoint/2010/main" val="2740131491"/>
+      </p:ext>
+    </p:extLst>
+  </p:cSld>
+  <p:clrMapOvr>
+    <a:masterClrMapping/>
+  </p:clrMapOvr>
+</p:sld>
+</file>
+
+<file path=ppt/slides/slide32.xml><?xml version="1.0" encoding="utf-8"?>
+<p:sld xmlns:a="http://schemas.openxmlformats.org/drawingml/2006/main" xmlns:r="http://schemas.openxmlformats.org/officeDocument/2006/relationships" xmlns:p="http://schemas.openxmlformats.org/presentationml/2006/main">
+  <p:cSld>
+    <p:spTree>
+      <p:nvGrpSpPr>
+        <p:cNvPr id="1" name=""/>
+        <p:cNvGrpSpPr/>
+        <p:nvPr/>
+      </p:nvGrpSpPr>
+      <p:grpSpPr>
+        <a:xfrm>
+          <a:off x="0" y="0"/>
+          <a:ext cx="0" cy="0"/>
+          <a:chOff x="0" y="0"/>
+          <a:chExt cx="0" cy="0"/>
+        </a:xfrm>
+      </p:grpSpPr>
+      <p:sp>
+        <p:nvSpPr>
           <p:cNvPr id="3" name="Titel 2"/>
           <p:cNvSpPr>
             <a:spLocks noGrp="1"/>
@@ -20848,7 +21388,7 @@
             <a:fld id="{8F35CB8A-22DD-4279-9E9E-A49CDB5FBE56}" type="slidenum">
               <a:rPr lang="en-US" smtClean="0"/>
               <a:pPr/>
-              <a:t>31</a:t>
+              <a:t>32</a:t>
             </a:fld>
             <a:endParaRPr lang="en-US"/>
           </a:p>
@@ -21045,7 +21585,7 @@
 </p:sld>
 </file>
 
-<file path=ppt/slides/slide32.xml><?xml version="1.0" encoding="utf-8"?>
+<file path=ppt/slides/slide33.xml><?xml version="1.0" encoding="utf-8"?>
 <p:sld xmlns:a="http://schemas.openxmlformats.org/drawingml/2006/main" xmlns:r="http://schemas.openxmlformats.org/officeDocument/2006/relationships" xmlns:p="http://schemas.openxmlformats.org/presentationml/2006/main">
   <p:cSld>
     <p:spTree>
@@ -21103,7 +21643,7 @@
             <a:fld id="{8F35CB8A-22DD-4279-9E9E-A49CDB5FBE56}" type="slidenum">
               <a:rPr lang="en-US" smtClean="0"/>
               <a:pPr/>
-              <a:t>32</a:t>
+              <a:t>33</a:t>
             </a:fld>
             <a:endParaRPr lang="en-US"/>
           </a:p>
@@ -21300,7 +21840,7 @@
 </p:sld>
 </file>
 
-<file path=ppt/slides/slide33.xml><?xml version="1.0" encoding="utf-8"?>
+<file path=ppt/slides/slide34.xml><?xml version="1.0" encoding="utf-8"?>
 <p:sld xmlns:a="http://schemas.openxmlformats.org/drawingml/2006/main" xmlns:r="http://schemas.openxmlformats.org/officeDocument/2006/relationships" xmlns:p="http://schemas.openxmlformats.org/presentationml/2006/main">
   <p:cSld>
     <p:spTree>
@@ -21358,7 +21898,7 @@
             <a:fld id="{8F35CB8A-22DD-4279-9E9E-A49CDB5FBE56}" type="slidenum">
               <a:rPr lang="en-US" smtClean="0"/>
               <a:pPr/>
-              <a:t>33</a:t>
+              <a:t>34</a:t>
             </a:fld>
             <a:endParaRPr lang="en-US"/>
           </a:p>
@@ -21551,7 +22091,7 @@
 </p:sld>
 </file>
 
-<file path=ppt/slides/slide34.xml><?xml version="1.0" encoding="utf-8"?>
+<file path=ppt/slides/slide35.xml><?xml version="1.0" encoding="utf-8"?>
 <p:sld xmlns:a="http://schemas.openxmlformats.org/drawingml/2006/main" xmlns:r="http://schemas.openxmlformats.org/officeDocument/2006/relationships" xmlns:p="http://schemas.openxmlformats.org/presentationml/2006/main">
   <p:cSld>
     <p:spTree>
@@ -21609,7 +22149,7 @@
             <a:fld id="{8F35CB8A-22DD-4279-9E9E-A49CDB5FBE56}" type="slidenum">
               <a:rPr lang="en-US" smtClean="0"/>
               <a:pPr/>
-              <a:t>34</a:t>
+              <a:t>35</a:t>
             </a:fld>
             <a:endParaRPr lang="en-US"/>
           </a:p>
@@ -21811,7 +22351,7 @@
 </p:sld>
 </file>
 
-<file path=ppt/slides/slide35.xml><?xml version="1.0" encoding="utf-8"?>
+<file path=ppt/slides/slide36.xml><?xml version="1.0" encoding="utf-8"?>
 <p:sld xmlns:a="http://schemas.openxmlformats.org/drawingml/2006/main" xmlns:r="http://schemas.openxmlformats.org/officeDocument/2006/relationships" xmlns:p="http://schemas.openxmlformats.org/presentationml/2006/main">
   <p:cSld>
     <p:spTree>
@@ -21869,7 +22409,7 @@
             <a:fld id="{8F35CB8A-22DD-4279-9E9E-A49CDB5FBE56}" type="slidenum">
               <a:rPr lang="en-US" smtClean="0"/>
               <a:pPr/>
-              <a:t>35</a:t>
+              <a:t>36</a:t>
             </a:fld>
             <a:endParaRPr lang="en-US"/>
           </a:p>
@@ -22075,7 +22615,7 @@
 </p:sld>
 </file>
 
-<file path=ppt/slides/slide36.xml><?xml version="1.0" encoding="utf-8"?>
+<file path=ppt/slides/slide37.xml><?xml version="1.0" encoding="utf-8"?>
 <p:sld xmlns:a="http://schemas.openxmlformats.org/drawingml/2006/main" xmlns:r="http://schemas.openxmlformats.org/officeDocument/2006/relationships" xmlns:p="http://schemas.openxmlformats.org/presentationml/2006/main">
   <p:cSld>
     <p:spTree>
@@ -22253,7 +22793,7 @@
             <a:fld id="{8F35CB8A-22DD-4279-9E9E-A49CDB5FBE56}" type="slidenum">
               <a:rPr lang="en-US" smtClean="0"/>
               <a:pPr/>
-              <a:t>36</a:t>
+              <a:t>37</a:t>
             </a:fld>
             <a:endParaRPr lang="en-US"/>
           </a:p>
@@ -22293,211 +22833,6 @@
     <p:extLst>
       <p:ext uri="{BB962C8B-B14F-4D97-AF65-F5344CB8AC3E}">
         <p14:creationId xmlns:p14="http://schemas.microsoft.com/office/powerpoint/2010/main" val="3161289557"/>
-      </p:ext>
-    </p:extLst>
-  </p:cSld>
-  <p:clrMapOvr>
-    <a:masterClrMapping/>
-  </p:clrMapOvr>
-</p:sld>
-</file>
-
-<file path=ppt/slides/slide37.xml><?xml version="1.0" encoding="utf-8"?>
-<p:sld xmlns:a="http://schemas.openxmlformats.org/drawingml/2006/main" xmlns:r="http://schemas.openxmlformats.org/officeDocument/2006/relationships" xmlns:p="http://schemas.openxmlformats.org/presentationml/2006/main">
-  <p:cSld>
-    <p:spTree>
-      <p:nvGrpSpPr>
-        <p:cNvPr id="1" name=""/>
-        <p:cNvGrpSpPr/>
-        <p:nvPr/>
-      </p:nvGrpSpPr>
-      <p:grpSpPr>
-        <a:xfrm>
-          <a:off x="0" y="0"/>
-          <a:ext cx="0" cy="0"/>
-          <a:chOff x="0" y="0"/>
-          <a:chExt cx="0" cy="0"/>
-        </a:xfrm>
-      </p:grpSpPr>
-      <p:sp>
-        <p:nvSpPr>
-          <p:cNvPr id="9" name="Titel 8"/>
-          <p:cNvSpPr>
-            <a:spLocks noGrp="1"/>
-          </p:cNvSpPr>
-          <p:nvPr>
-            <p:ph type="title"/>
-          </p:nvPr>
-        </p:nvSpPr>
-        <p:spPr/>
-        <p:txBody>
-          <a:bodyPr/>
-          <a:lstStyle/>
-          <a:p>
-            <a:r>
-              <a:rPr lang="de-DE" dirty="0" smtClean="0"/>
-              <a:t>4. Zusammenfassung</a:t>
-            </a:r>
-            <a:endParaRPr lang="de-DE" dirty="0"/>
-          </a:p>
-        </p:txBody>
-      </p:sp>
-      <p:sp>
-        <p:nvSpPr>
-          <p:cNvPr id="10" name="Inhaltsplatzhalter 9"/>
-          <p:cNvSpPr>
-            <a:spLocks noGrp="1"/>
-          </p:cNvSpPr>
-          <p:nvPr>
-            <p:ph idx="1"/>
-          </p:nvPr>
-        </p:nvSpPr>
-        <p:spPr/>
-        <p:txBody>
-          <a:bodyPr/>
-          <a:lstStyle/>
-          <a:p>
-            <a:pPr>
-              <a:lnSpc>
-                <a:spcPct val="150000"/>
-              </a:lnSpc>
-            </a:pPr>
-            <a:r>
-              <a:rPr lang="de-DE" dirty="0" smtClean="0"/>
-              <a:t>Vielseitige, aktuelle Themen:</a:t>
-            </a:r>
-          </a:p>
-          <a:p>
-            <a:pPr lvl="1">
-              <a:lnSpc>
-                <a:spcPct val="150000"/>
-              </a:lnSpc>
-            </a:pPr>
-            <a:r>
-              <a:rPr lang="de-DE" dirty="0" smtClean="0"/>
-              <a:t>Web: ASP.NET MVC, ASP.NET Web API</a:t>
-            </a:r>
-          </a:p>
-          <a:p>
-            <a:pPr lvl="1">
-              <a:lnSpc>
-                <a:spcPct val="150000"/>
-              </a:lnSpc>
-            </a:pPr>
-            <a:r>
-              <a:rPr lang="de-DE" dirty="0" smtClean="0"/>
-              <a:t>Datenbanken: Entity Framework</a:t>
-            </a:r>
-          </a:p>
-          <a:p>
-            <a:pPr lvl="1">
-              <a:lnSpc>
-                <a:spcPct val="150000"/>
-              </a:lnSpc>
-            </a:pPr>
-            <a:r>
-              <a:rPr lang="de-DE" dirty="0" smtClean="0"/>
-              <a:t>Windows Runtime: Windows Phone App</a:t>
-            </a:r>
-          </a:p>
-          <a:p>
-            <a:pPr>
-              <a:lnSpc>
-                <a:spcPct val="150000"/>
-              </a:lnSpc>
-            </a:pPr>
-            <a:r>
-              <a:rPr lang="de-DE" dirty="0" smtClean="0"/>
-              <a:t>Workshop Bestandteile:</a:t>
-            </a:r>
-          </a:p>
-          <a:p>
-            <a:pPr lvl="1">
-              <a:lnSpc>
-                <a:spcPct val="150000"/>
-              </a:lnSpc>
-            </a:pPr>
-            <a:r>
-              <a:rPr lang="de-DE" dirty="0" smtClean="0"/>
-              <a:t>Talks</a:t>
-            </a:r>
-          </a:p>
-          <a:p>
-            <a:pPr lvl="1">
-              <a:lnSpc>
-                <a:spcPct val="150000"/>
-              </a:lnSpc>
-            </a:pPr>
-            <a:r>
-              <a:rPr lang="de-DE" dirty="0" smtClean="0"/>
-              <a:t>Demos</a:t>
-            </a:r>
-          </a:p>
-          <a:p>
-            <a:pPr lvl="1">
-              <a:lnSpc>
-                <a:spcPct val="150000"/>
-              </a:lnSpc>
-            </a:pPr>
-            <a:r>
-              <a:rPr lang="de-DE" dirty="0" smtClean="0"/>
-              <a:t>Hands-On-Sessions</a:t>
-            </a:r>
-          </a:p>
-          <a:p>
-            <a:pPr>
-              <a:lnSpc>
-                <a:spcPct val="150000"/>
-              </a:lnSpc>
-            </a:pPr>
-            <a:r>
-              <a:rPr lang="de-DE" dirty="0" smtClean="0"/>
-              <a:t>Nächstes Modul: </a:t>
-            </a:r>
-            <a:r>
-              <a:rPr lang="de-DE" dirty="0"/>
-              <a:t>Vorbereitung und Projektsetup</a:t>
-            </a:r>
-            <a:endParaRPr lang="de-DE" dirty="0" smtClean="0"/>
-          </a:p>
-          <a:p>
-            <a:pPr>
-              <a:lnSpc>
-                <a:spcPct val="150000"/>
-              </a:lnSpc>
-            </a:pPr>
-            <a:endParaRPr lang="de-DE" dirty="0"/>
-          </a:p>
-        </p:txBody>
-      </p:sp>
-      <p:sp>
-        <p:nvSpPr>
-          <p:cNvPr id="4" name="Foliennummernplatzhalter 3"/>
-          <p:cNvSpPr>
-            <a:spLocks noGrp="1"/>
-          </p:cNvSpPr>
-          <p:nvPr>
-            <p:ph type="sldNum" sz="quarter" idx="12"/>
-          </p:nvPr>
-        </p:nvSpPr>
-        <p:spPr/>
-        <p:txBody>
-          <a:bodyPr/>
-          <a:lstStyle/>
-          <a:p>
-            <a:fld id="{8F35CB8A-22DD-4279-9E9E-A49CDB5FBE56}" type="slidenum">
-              <a:rPr lang="en-US" smtClean="0"/>
-              <a:pPr/>
-              <a:t>37</a:t>
-            </a:fld>
-            <a:endParaRPr lang="en-US"/>
-          </a:p>
-        </p:txBody>
-      </p:sp>
-    </p:spTree>
-    <p:extLst>
-      <p:ext uri="{BB962C8B-B14F-4D97-AF65-F5344CB8AC3E}">
-        <p14:creationId xmlns:p14="http://schemas.microsoft.com/office/powerpoint/2010/main" val="3922619173"/>
       </p:ext>
     </p:extLst>
   </p:cSld>
@@ -22526,6 +22861,211 @@
       </p:grpSpPr>
       <p:sp>
         <p:nvSpPr>
+          <p:cNvPr id="9" name="Titel 8"/>
+          <p:cNvSpPr>
+            <a:spLocks noGrp="1"/>
+          </p:cNvSpPr>
+          <p:nvPr>
+            <p:ph type="title"/>
+          </p:nvPr>
+        </p:nvSpPr>
+        <p:spPr/>
+        <p:txBody>
+          <a:bodyPr/>
+          <a:lstStyle/>
+          <a:p>
+            <a:r>
+              <a:rPr lang="de-DE" dirty="0" smtClean="0"/>
+              <a:t>4. Zusammenfassung</a:t>
+            </a:r>
+            <a:endParaRPr lang="de-DE" dirty="0"/>
+          </a:p>
+        </p:txBody>
+      </p:sp>
+      <p:sp>
+        <p:nvSpPr>
+          <p:cNvPr id="10" name="Inhaltsplatzhalter 9"/>
+          <p:cNvSpPr>
+            <a:spLocks noGrp="1"/>
+          </p:cNvSpPr>
+          <p:nvPr>
+            <p:ph idx="1"/>
+          </p:nvPr>
+        </p:nvSpPr>
+        <p:spPr/>
+        <p:txBody>
+          <a:bodyPr/>
+          <a:lstStyle/>
+          <a:p>
+            <a:pPr>
+              <a:lnSpc>
+                <a:spcPct val="150000"/>
+              </a:lnSpc>
+            </a:pPr>
+            <a:r>
+              <a:rPr lang="de-DE" dirty="0" smtClean="0"/>
+              <a:t>Vielseitige, aktuelle Themen:</a:t>
+            </a:r>
+          </a:p>
+          <a:p>
+            <a:pPr lvl="1">
+              <a:lnSpc>
+                <a:spcPct val="150000"/>
+              </a:lnSpc>
+            </a:pPr>
+            <a:r>
+              <a:rPr lang="de-DE" dirty="0" smtClean="0"/>
+              <a:t>Web: ASP.NET MVC, ASP.NET Web API</a:t>
+            </a:r>
+          </a:p>
+          <a:p>
+            <a:pPr lvl="1">
+              <a:lnSpc>
+                <a:spcPct val="150000"/>
+              </a:lnSpc>
+            </a:pPr>
+            <a:r>
+              <a:rPr lang="de-DE" dirty="0" smtClean="0"/>
+              <a:t>Datenbanken: Entity Framework</a:t>
+            </a:r>
+          </a:p>
+          <a:p>
+            <a:pPr lvl="1">
+              <a:lnSpc>
+                <a:spcPct val="150000"/>
+              </a:lnSpc>
+            </a:pPr>
+            <a:r>
+              <a:rPr lang="de-DE" dirty="0" smtClean="0"/>
+              <a:t>Windows Runtime: Windows Phone App</a:t>
+            </a:r>
+          </a:p>
+          <a:p>
+            <a:pPr>
+              <a:lnSpc>
+                <a:spcPct val="150000"/>
+              </a:lnSpc>
+            </a:pPr>
+            <a:r>
+              <a:rPr lang="de-DE" dirty="0" smtClean="0"/>
+              <a:t>Workshop Bestandteile:</a:t>
+            </a:r>
+          </a:p>
+          <a:p>
+            <a:pPr lvl="1">
+              <a:lnSpc>
+                <a:spcPct val="150000"/>
+              </a:lnSpc>
+            </a:pPr>
+            <a:r>
+              <a:rPr lang="de-DE" dirty="0" smtClean="0"/>
+              <a:t>Talks</a:t>
+            </a:r>
+          </a:p>
+          <a:p>
+            <a:pPr lvl="1">
+              <a:lnSpc>
+                <a:spcPct val="150000"/>
+              </a:lnSpc>
+            </a:pPr>
+            <a:r>
+              <a:rPr lang="de-DE" dirty="0" smtClean="0"/>
+              <a:t>Demos</a:t>
+            </a:r>
+          </a:p>
+          <a:p>
+            <a:pPr lvl="1">
+              <a:lnSpc>
+                <a:spcPct val="150000"/>
+              </a:lnSpc>
+            </a:pPr>
+            <a:r>
+              <a:rPr lang="de-DE" dirty="0" smtClean="0"/>
+              <a:t>Hands-On-Sessions</a:t>
+            </a:r>
+          </a:p>
+          <a:p>
+            <a:pPr>
+              <a:lnSpc>
+                <a:spcPct val="150000"/>
+              </a:lnSpc>
+            </a:pPr>
+            <a:r>
+              <a:rPr lang="de-DE" dirty="0" smtClean="0"/>
+              <a:t>Nächstes Modul: </a:t>
+            </a:r>
+            <a:r>
+              <a:rPr lang="de-DE" dirty="0"/>
+              <a:t>Vorbereitung und Projektsetup</a:t>
+            </a:r>
+            <a:endParaRPr lang="de-DE" dirty="0" smtClean="0"/>
+          </a:p>
+          <a:p>
+            <a:pPr>
+              <a:lnSpc>
+                <a:spcPct val="150000"/>
+              </a:lnSpc>
+            </a:pPr>
+            <a:endParaRPr lang="de-DE" dirty="0"/>
+          </a:p>
+        </p:txBody>
+      </p:sp>
+      <p:sp>
+        <p:nvSpPr>
+          <p:cNvPr id="4" name="Foliennummernplatzhalter 3"/>
+          <p:cNvSpPr>
+            <a:spLocks noGrp="1"/>
+          </p:cNvSpPr>
+          <p:nvPr>
+            <p:ph type="sldNum" sz="quarter" idx="12"/>
+          </p:nvPr>
+        </p:nvSpPr>
+        <p:spPr/>
+        <p:txBody>
+          <a:bodyPr/>
+          <a:lstStyle/>
+          <a:p>
+            <a:fld id="{8F35CB8A-22DD-4279-9E9E-A49CDB5FBE56}" type="slidenum">
+              <a:rPr lang="en-US" smtClean="0"/>
+              <a:pPr/>
+              <a:t>38</a:t>
+            </a:fld>
+            <a:endParaRPr lang="en-US"/>
+          </a:p>
+        </p:txBody>
+      </p:sp>
+    </p:spTree>
+    <p:extLst>
+      <p:ext uri="{BB962C8B-B14F-4D97-AF65-F5344CB8AC3E}">
+        <p14:creationId xmlns:p14="http://schemas.microsoft.com/office/powerpoint/2010/main" val="3922619173"/>
+      </p:ext>
+    </p:extLst>
+  </p:cSld>
+  <p:clrMapOvr>
+    <a:masterClrMapping/>
+  </p:clrMapOvr>
+</p:sld>
+</file>
+
+<file path=ppt/slides/slide39.xml><?xml version="1.0" encoding="utf-8"?>
+<p:sld xmlns:a="http://schemas.openxmlformats.org/drawingml/2006/main" xmlns:r="http://schemas.openxmlformats.org/officeDocument/2006/relationships" xmlns:p="http://schemas.openxmlformats.org/presentationml/2006/main">
+  <p:cSld>
+    <p:spTree>
+      <p:nvGrpSpPr>
+        <p:cNvPr id="1" name=""/>
+        <p:cNvGrpSpPr/>
+        <p:nvPr/>
+      </p:nvGrpSpPr>
+      <p:grpSpPr>
+        <a:xfrm>
+          <a:off x="0" y="0"/>
+          <a:ext cx="0" cy="0"/>
+          <a:chOff x="0" y="0"/>
+          <a:chExt cx="0" cy="0"/>
+        </a:xfrm>
+      </p:grpSpPr>
+      <p:sp>
+        <p:nvSpPr>
           <p:cNvPr id="12" name="Foliennummernplatzhalter 11"/>
           <p:cNvSpPr>
             <a:spLocks noGrp="1"/>
@@ -22547,7 +23087,7 @@
               <a:pPr>
                 <a:defRPr/>
               </a:pPr>
-              <a:t>38</a:t>
+              <a:t>39</a:t>
             </a:fld>
             <a:endParaRPr lang="sv-SE" dirty="0"/>
           </a:p>
@@ -22817,6 +23357,13 @@
           <a:prstGeom prst="rect">
             <a:avLst/>
           </a:prstGeom>
+          <a:effectLst>
+            <a:outerShdw blurRad="50800" dist="38100" dir="2700000" algn="tl" rotWithShape="0">
+              <a:prstClr val="black">
+                <a:alpha val="40000"/>
+              </a:prstClr>
+            </a:outerShdw>
+          </a:effectLst>
         </p:spPr>
       </p:pic>
     </p:spTree>
@@ -23297,7 +23844,7 @@
           <p:nvPr>
             <p:extLst>
               <p:ext uri="{D42A27DB-BD31-4B8C-83A1-F6EECF244321}">
-                <p14:modId xmlns:p14="http://schemas.microsoft.com/office/powerpoint/2010/main" val="1438222771"/>
+                <p14:modId xmlns:p14="http://schemas.microsoft.com/office/powerpoint/2010/main" val="416648934"/>
               </p:ext>
             </p:extLst>
           </p:nvPr>
@@ -23400,11 +23947,7 @@
                     <a:p>
                       <a:r>
                         <a:rPr lang="de-DE" dirty="0" smtClean="0"/>
-                        <a:t>10:30 – </a:t>
-                      </a:r>
-                      <a:r>
-                        <a:rPr lang="de-DE" dirty="0" smtClean="0"/>
-                        <a:t>11:00</a:t>
+                        <a:t>10:30 – 11:15</a:t>
                       </a:r>
                       <a:endParaRPr lang="de-DE" dirty="0"/>
                     </a:p>
@@ -23451,11 +23994,7 @@
                       </a:pPr>
                       <a:r>
                         <a:rPr lang="de-DE" dirty="0" smtClean="0"/>
-                        <a:t>11:00 </a:t>
-                      </a:r>
-                      <a:r>
-                        <a:rPr lang="de-DE" dirty="0" smtClean="0"/>
-                        <a:t>– 12:30</a:t>
+                        <a:t>11:15 – 12:30</a:t>
                       </a:r>
                     </a:p>
                   </a:txBody>
@@ -23522,7 +24061,7 @@
                     <a:p>
                       <a:pPr algn="ctr"/>
                       <a:r>
-                        <a:rPr lang="de-DE" b="0" smtClean="0"/>
+                        <a:rPr lang="de-DE" b="0" dirty="0" smtClean="0"/>
                         <a:t>- Mittagspause-</a:t>
                       </a:r>
                       <a:endParaRPr lang="de-DE" b="0" dirty="0"/>
@@ -23631,12 +24170,12 @@
                     <a:lstStyle/>
                     <a:p>
                       <a:r>
-                        <a:rPr lang="de-DE" dirty="0" smtClean="0"/>
-                        <a:t>15:30 – </a:t>
+                        <a:rPr lang="de-DE" smtClean="0"/>
+                        <a:t>15:30 </a:t>
                       </a:r>
                       <a:r>
                         <a:rPr lang="de-DE" dirty="0" smtClean="0"/>
-                        <a:t>17:30</a:t>
+                        <a:t>– 17:00</a:t>
                       </a:r>
                       <a:endParaRPr lang="de-DE" dirty="0"/>
                     </a:p>
@@ -23844,7 +24383,7 @@
       </p:sp>
       <p:sp>
         <p:nvSpPr>
-          <p:cNvPr id="7" name="Untertitel 3"/>
+          <p:cNvPr id="2" name="Untertitel 1"/>
           <p:cNvSpPr>
             <a:spLocks noGrp="1"/>
           </p:cNvSpPr>
@@ -23852,21 +24391,12 @@
             <p:ph type="subTitle" idx="1"/>
           </p:nvPr>
         </p:nvSpPr>
-        <p:spPr>
-          <a:xfrm>
-            <a:off x="587299" y="1354965"/>
-            <a:ext cx="7565040" cy="594486"/>
-          </a:xfrm>
-        </p:spPr>
+        <p:spPr/>
         <p:txBody>
           <a:bodyPr/>
           <a:lstStyle/>
           <a:p>
-            <a:r>
-              <a:rPr lang="de-DE" dirty="0" smtClean="0"/>
-              <a:t>Constantin Petsch</a:t>
-            </a:r>
-            <a:endParaRPr lang="de-DE" dirty="0"/>
+            <a:endParaRPr lang="de-DE"/>
           </a:p>
         </p:txBody>
       </p:sp>

</xml_diff>